<commit_message>
Add comments to 12-Implementation-of-Information-System.pptx
</commit_message>
<xml_diff>
--- a/Courses/Software-Sciences/Module-4-Information-Systems-New/12-Implementation-of-Information-System/12-Implementation-of-Information-System.pptx
+++ b/Courses/Software-Sciences/Module-4-Information-Systems-New/12-Implementation-of-Information-System/12-Implementation-of-Information-System.pptx
@@ -244,10 +244,211 @@
       </p:ext>
     </p:extLst>
   </p:cmAuthor>
+  <p:cmAuthor id="2" name="Mirela Damyanova" initials="MD" lastIdx="18" clrIdx="1">
+    <p:extLst>
+      <p:ext uri="{19B8F6BF-5375-455C-9EA6-DF929625EA0E}">
+        <p15:presenceInfo xmlns:p15="http://schemas.microsoft.com/office/powerpoint/2012/main" userId="Mirela Damyanova" providerId="None"/>
+      </p:ext>
+    </p:extLst>
+  </p:cmAuthor>
 </p:cmAuthorLst>
 </file>
 
 <file path=ppt/comments/comment1.xml><?xml version="1.0" encoding="utf-8"?>
+<p:cmLst xmlns:a="http://schemas.openxmlformats.org/drawingml/2006/main" xmlns:r="http://schemas.openxmlformats.org/officeDocument/2006/relationships" xmlns:p="http://schemas.openxmlformats.org/presentationml/2006/main">
+  <p:cm authorId="2" dt="2024-10-13T10:16:17.645" idx="2">
+    <p:pos x="7298" y="1262"/>
+    <p:text>Скрийншотът ще се промени</p:text>
+    <p:extLst>
+      <p:ext uri="{C676402C-5697-4E1C-873F-D02D1690AC5C}">
+        <p15:threadingInfo xmlns:p15="http://schemas.microsoft.com/office/powerpoint/2012/main" timeZoneBias="-180"/>
+      </p:ext>
+    </p:extLst>
+  </p:cm>
+</p:cmLst>
+</file>
+
+<file path=ppt/comments/comment10.xml><?xml version="1.0" encoding="utf-8"?>
+<p:cmLst xmlns:a="http://schemas.openxmlformats.org/drawingml/2006/main" xmlns:r="http://schemas.openxmlformats.org/officeDocument/2006/relationships" xmlns:p="http://schemas.openxmlformats.org/presentationml/2006/main">
+  <p:cm authorId="2" dt="2024-10-13T10:20:01.206" idx="16">
+    <p:pos x="5786" y="544"/>
+    <p:text>Ще се промени</p:text>
+    <p:extLst>
+      <p:ext uri="{C676402C-5697-4E1C-873F-D02D1690AC5C}">
+        <p15:threadingInfo xmlns:p15="http://schemas.microsoft.com/office/powerpoint/2012/main" timeZoneBias="-180"/>
+      </p:ext>
+    </p:extLst>
+  </p:cm>
+  <p:cm authorId="2" dt="2024-10-13T10:20:40.852" idx="18">
+    <p:pos x="7086" y="3010"/>
+    <p:text>Ще се редактира всичко от тази секция</p:text>
+    <p:extLst>
+      <p:ext uri="{C676402C-5697-4E1C-873F-D02D1690AC5C}">
+        <p15:threadingInfo xmlns:p15="http://schemas.microsoft.com/office/powerpoint/2012/main" timeZoneBias="-180"/>
+      </p:ext>
+    </p:extLst>
+  </p:cm>
+</p:cmLst>
+</file>
+
+<file path=ppt/comments/comment11.xml><?xml version="1.0" encoding="utf-8"?>
+<p:cmLst xmlns:a="http://schemas.openxmlformats.org/drawingml/2006/main" xmlns:r="http://schemas.openxmlformats.org/officeDocument/2006/relationships" xmlns:p="http://schemas.openxmlformats.org/presentationml/2006/main">
+  <p:cm authorId="2" dt="2024-10-13T10:20:19.489" idx="17">
+    <p:pos x="5271" y="772"/>
+    <p:text>Ще се добавят още проверки и обяснения</p:text>
+    <p:extLst>
+      <p:ext uri="{C676402C-5697-4E1C-873F-D02D1690AC5C}">
+        <p15:threadingInfo xmlns:p15="http://schemas.microsoft.com/office/powerpoint/2012/main" timeZoneBias="-180"/>
+      </p:ext>
+    </p:extLst>
+  </p:cm>
+</p:cmLst>
+</file>
+
+<file path=ppt/comments/comment2.xml><?xml version="1.0" encoding="utf-8"?>
+<p:cmLst xmlns:a="http://schemas.openxmlformats.org/drawingml/2006/main" xmlns:r="http://schemas.openxmlformats.org/officeDocument/2006/relationships" xmlns:p="http://schemas.openxmlformats.org/presentationml/2006/main">
+  <p:cm authorId="2" dt="2024-10-13T10:16:30.112" idx="3">
+    <p:pos x="3706" y="1152"/>
+    <p:text>Ще се добави криптиране на парола</p:text>
+    <p:extLst>
+      <p:ext uri="{C676402C-5697-4E1C-873F-D02D1690AC5C}">
+        <p15:threadingInfo xmlns:p15="http://schemas.microsoft.com/office/powerpoint/2012/main" timeZoneBias="-180"/>
+      </p:ext>
+    </p:extLst>
+  </p:cm>
+  <p:cm authorId="2" dt="2024-10-13T10:16:46.312" idx="4">
+    <p:pos x="4684" y="1435"/>
+    <p:text>Ще се промени на две главни форми</p:text>
+    <p:extLst>
+      <p:ext uri="{C676402C-5697-4E1C-873F-D02D1690AC5C}">
+        <p15:threadingInfo xmlns:p15="http://schemas.microsoft.com/office/powerpoint/2012/main" timeZoneBias="-180"/>
+      </p:ext>
+    </p:extLst>
+  </p:cm>
+  <p:cm authorId="2" dt="2024-10-13T10:16:56.490" idx="5">
+    <p:pos x="4369" y="2043"/>
+    <p:text>Ще се махне</p:text>
+    <p:extLst>
+      <p:ext uri="{C676402C-5697-4E1C-873F-D02D1690AC5C}">
+        <p15:threadingInfo xmlns:p15="http://schemas.microsoft.com/office/powerpoint/2012/main" timeZoneBias="-180"/>
+      </p:ext>
+    </p:extLst>
+  </p:cm>
+  <p:cm authorId="2" dt="2024-10-13T10:17:08.283" idx="6">
+    <p:pos x="4706" y="2619"/>
+    <p:text>Ще се добави CRUD за администратора</p:text>
+    <p:extLst>
+      <p:ext uri="{C676402C-5697-4E1C-873F-D02D1690AC5C}">
+        <p15:threadingInfo xmlns:p15="http://schemas.microsoft.com/office/powerpoint/2012/main" timeZoneBias="-180"/>
+      </p:ext>
+    </p:extLst>
+  </p:cm>
+  <p:cm authorId="2" dt="2024-10-13T10:17:22.458" idx="7">
+    <p:pos x="4749" y="2934"/>
+    <p:text>Ще се добави пълен CRUD навсякъде</p:text>
+    <p:extLst>
+      <p:ext uri="{C676402C-5697-4E1C-873F-D02D1690AC5C}">
+        <p15:threadingInfo xmlns:p15="http://schemas.microsoft.com/office/powerpoint/2012/main" timeZoneBias="-180"/>
+      </p:ext>
+    </p:extLst>
+  </p:cm>
+</p:cmLst>
+</file>
+
+<file path=ppt/comments/comment3.xml><?xml version="1.0" encoding="utf-8"?>
+<p:cmLst xmlns:a="http://schemas.openxmlformats.org/drawingml/2006/main" xmlns:r="http://schemas.openxmlformats.org/officeDocument/2006/relationships" xmlns:p="http://schemas.openxmlformats.org/presentationml/2006/main">
+  <p:cm authorId="2" dt="2024-10-13T10:17:45.113" idx="8">
+    <p:pos x="5697" y="328"/>
+    <p:text>Ще се промени</p:text>
+    <p:extLst>
+      <p:ext uri="{C676402C-5697-4E1C-873F-D02D1690AC5C}">
+        <p15:threadingInfo xmlns:p15="http://schemas.microsoft.com/office/powerpoint/2012/main" timeZoneBias="-180"/>
+      </p:ext>
+    </p:extLst>
+  </p:cm>
+</p:cmLst>
+</file>
+
+<file path=ppt/comments/comment4.xml><?xml version="1.0" encoding="utf-8"?>
+<p:cmLst xmlns:a="http://schemas.openxmlformats.org/drawingml/2006/main" xmlns:r="http://schemas.openxmlformats.org/officeDocument/2006/relationships" xmlns:p="http://schemas.openxmlformats.org/presentationml/2006/main">
+  <p:cm authorId="2" dt="2024-10-13T10:17:55.655" idx="9">
+    <p:pos x="7283" y="884"/>
+    <p:text>Ще се промени</p:text>
+    <p:extLst>
+      <p:ext uri="{C676402C-5697-4E1C-873F-D02D1690AC5C}">
+        <p15:threadingInfo xmlns:p15="http://schemas.microsoft.com/office/powerpoint/2012/main" timeZoneBias="-180"/>
+      </p:ext>
+    </p:extLst>
+  </p:cm>
+</p:cmLst>
+</file>
+
+<file path=ppt/comments/comment5.xml><?xml version="1.0" encoding="utf-8"?>
+<p:cmLst xmlns:a="http://schemas.openxmlformats.org/drawingml/2006/main" xmlns:r="http://schemas.openxmlformats.org/officeDocument/2006/relationships" xmlns:p="http://schemas.openxmlformats.org/presentationml/2006/main">
+  <p:cm authorId="2" dt="2024-10-13T10:18:17.223" idx="11">
+    <p:pos x="5301" y="173"/>
+    <p:text>Ще се промени</p:text>
+    <p:extLst>
+      <p:ext uri="{C676402C-5697-4E1C-873F-D02D1690AC5C}">
+        <p15:threadingInfo xmlns:p15="http://schemas.microsoft.com/office/powerpoint/2012/main" timeZoneBias="-180"/>
+      </p:ext>
+    </p:extLst>
+  </p:cm>
+  <p:cm authorId="2" dt="2024-10-13T10:18:25.615" idx="12">
+    <p:pos x="7021" y="2945"/>
+    <p:text>Ще се опишат двете главни форми</p:text>
+    <p:extLst>
+      <p:ext uri="{C676402C-5697-4E1C-873F-D02D1690AC5C}">
+        <p15:threadingInfo xmlns:p15="http://schemas.microsoft.com/office/powerpoint/2012/main" timeZoneBias="-180"/>
+      </p:ext>
+    </p:extLst>
+  </p:cm>
+</p:cmLst>
+</file>
+
+<file path=ppt/comments/comment6.xml><?xml version="1.0" encoding="utf-8"?>
+<p:cmLst xmlns:a="http://schemas.openxmlformats.org/drawingml/2006/main" xmlns:r="http://schemas.openxmlformats.org/officeDocument/2006/relationships" xmlns:p="http://schemas.openxmlformats.org/presentationml/2006/main">
+  <p:cm authorId="2" dt="2024-10-13T10:18:42.503" idx="13">
+    <p:pos x="6130" y="772"/>
+    <p:text>Всичко това ще се промени по проекта, това е стара негова версия</p:text>
+    <p:extLst>
+      <p:ext uri="{C676402C-5697-4E1C-873F-D02D1690AC5C}">
+        <p15:threadingInfo xmlns:p15="http://schemas.microsoft.com/office/powerpoint/2012/main" timeZoneBias="-180"/>
+      </p:ext>
+    </p:extLst>
+  </p:cm>
+</p:cmLst>
+</file>
+
+<file path=ppt/comments/comment7.xml><?xml version="1.0" encoding="utf-8"?>
+<p:cmLst xmlns:a="http://schemas.openxmlformats.org/drawingml/2006/main" xmlns:r="http://schemas.openxmlformats.org/officeDocument/2006/relationships" xmlns:p="http://schemas.openxmlformats.org/presentationml/2006/main">
+  <p:cm authorId="2" dt="2024-10-13T10:19:39.676" idx="14">
+    <p:pos x="4304" y="772"/>
+    <p:text>Ще обясняваме функционалността на двете основни форми, всичко останало ще е по разделени форми</p:text>
+    <p:extLst>
+      <p:ext uri="{C676402C-5697-4E1C-873F-D02D1690AC5C}">
+        <p15:threadingInfo xmlns:p15="http://schemas.microsoft.com/office/powerpoint/2012/main" timeZoneBias="-180"/>
+      </p:ext>
+    </p:extLst>
+  </p:cm>
+</p:cmLst>
+</file>
+
+<file path=ppt/comments/comment8.xml><?xml version="1.0" encoding="utf-8"?>
+<p:cmLst xmlns:a="http://schemas.openxmlformats.org/drawingml/2006/main" xmlns:r="http://schemas.openxmlformats.org/officeDocument/2006/relationships" xmlns:p="http://schemas.openxmlformats.org/presentationml/2006/main">
+  <p:cm authorId="2" dt="2024-10-13T10:19:50.182" idx="15">
+    <p:pos x="7010" y="772"/>
+    <p:text>Няма да има мастър-детайл</p:text>
+    <p:extLst>
+      <p:ext uri="{C676402C-5697-4E1C-873F-D02D1690AC5C}">
+        <p15:threadingInfo xmlns:p15="http://schemas.microsoft.com/office/powerpoint/2012/main" timeZoneBias="-180"/>
+      </p:ext>
+    </p:extLst>
+  </p:cm>
+</p:cmLst>
+</file>
+
+<file path=ppt/comments/comment9.xml><?xml version="1.0" encoding="utf-8"?>
 <p:cmLst xmlns:a="http://schemas.openxmlformats.org/drawingml/2006/main" xmlns:r="http://schemas.openxmlformats.org/officeDocument/2006/relationships" xmlns:p="http://schemas.openxmlformats.org/presentationml/2006/main">
   <p:cm authorId="1" dt="2024-10-12T16:05:32.300" idx="2">
     <p:pos x="10" y="10"/>
@@ -256,6 +457,17 @@
     <p:extLst>
       <p:ext uri="{C676402C-5697-4E1C-873F-D02D1690AC5C}">
         <p15:threadingInfo xmlns:p15="http://schemas.microsoft.com/office/powerpoint/2012/main" timeZoneBias="-180"/>
+      </p:ext>
+    </p:extLst>
+  </p:cm>
+  <p:cm authorId="2" dt="2024-10-13T10:15:38.782" idx="1">
+    <p:pos x="10" y="123"/>
+    <p:text>Презентацията в момента я оправям. Когато стигна до тук, ще може да добавя иконките, които се ползват в самия практически проект. :)</p:text>
+    <p:extLst>
+      <p:ext uri="{C676402C-5697-4E1C-873F-D02D1690AC5C}">
+        <p15:threadingInfo xmlns:p15="http://schemas.microsoft.com/office/powerpoint/2012/main" timeZoneBias="-180">
+          <p15:parentCm authorId="1" idx="2"/>
+        </p15:threadingInfo>
       </p:ext>
     </p:extLst>
   </p:cm>
@@ -356,7 +568,7 @@
           <a:p>
             <a:fld id="{4E087215-0C8F-4762-A664-737A353EC9A4}" type="datetimeFigureOut">
               <a:rPr lang="bg-BG" smtClean="0"/>
-              <a:t>12.10.2024 г.</a:t>
+              <a:t>13.10.24 г.</a:t>
             </a:fld>
             <a:endParaRPr lang="bg-BG"/>
           </a:p>
@@ -552,7 +764,7 @@
           <a:p>
             <a:fld id="{72D84649-876A-46C9-8472-14CB09C070D8}" type="datetimeFigureOut">
               <a:rPr lang="en-US" smtClean="0"/>
-              <a:t>10/12/2024</a:t>
+              <a:t>10/13/24</a:t>
             </a:fld>
             <a:endParaRPr lang="en-US"/>
           </a:p>
@@ -9189,13 +9401,6 @@
       <p:transition spd="slow" advClick="0" advTm="5000"/>
     </mc:Fallback>
   </mc:AlternateContent>
-  <p:timing>
-    <p:tnLst>
-      <p:par>
-        <p:cTn id="1" dur="indefinite" restart="never" nodeType="tmRoot"/>
-      </p:par>
-    </p:tnLst>
-  </p:timing>
 </p:sld>
 </file>
 
@@ -10232,13 +10437,6 @@
       <p:transition spd="slow" advClick="0" advTm="5000"/>
     </mc:Fallback>
   </mc:AlternateContent>
-  <p:timing>
-    <p:tnLst>
-      <p:par>
-        <p:cTn id="1" dur="indefinite" restart="never" nodeType="tmRoot"/>
-      </p:par>
-    </p:tnLst>
-  </p:timing>
 </p:sld>
 </file>
 
@@ -11177,13 +11375,6 @@
       <p:transition spd="slow" advClick="0" advTm="5000"/>
     </mc:Fallback>
   </mc:AlternateContent>
-  <p:timing>
-    <p:tnLst>
-      <p:par>
-        <p:cTn id="1" dur="indefinite" restart="never" nodeType="tmRoot"/>
-      </p:par>
-    </p:tnLst>
-  </p:timing>
 </p:sld>
 </file>
 
@@ -12951,13 +13142,8 @@
             <a:pPr lvl="1"/>
             <a:r>
               <a:rPr lang="bg-BG" b="1" dirty="0"/>
-              <a:t>Изтриване на </a:t>
-            </a:r>
-            <a:r>
-              <a:rPr lang="bg-BG" b="1" dirty="0" smtClean="0"/>
-              <a:t>лекар</a:t>
-            </a:r>
-            <a:endParaRPr lang="bg-BG" b="1" dirty="0"/>
+              <a:t>Изтриване на лекар</a:t>
+            </a:r>
           </a:p>
         </p:txBody>
       </p:sp>
@@ -14452,13 +14638,6 @@
       <p:transition spd="slow" advClick="0" advTm="5000"/>
     </mc:Fallback>
   </mc:AlternateContent>
-  <p:timing>
-    <p:tnLst>
-      <p:par>
-        <p:cTn id="1" dur="indefinite" restart="never" nodeType="tmRoot"/>
-      </p:par>
-    </p:tnLst>
-  </p:timing>
 </p:sld>
 </file>
 
@@ -16331,13 +16510,6 @@
       <p:transition spd="slow" advClick="0" advTm="5000"/>
     </mc:Fallback>
   </mc:AlternateContent>
-  <p:timing>
-    <p:tnLst>
-      <p:par>
-        <p:cTn id="1" dur="indefinite" restart="never" nodeType="tmRoot"/>
-      </p:par>
-    </p:tnLst>
-  </p:timing>
 </p:sld>
 </file>
 
@@ -17970,13 +18142,6 @@
       <p:transition spd="slow" advClick="0" advTm="5000"/>
     </mc:Fallback>
   </mc:AlternateContent>
-  <p:timing>
-    <p:tnLst>
-      <p:par>
-        <p:cTn id="1" dur="indefinite" restart="never" nodeType="tmRoot"/>
-      </p:par>
-    </p:tnLst>
-  </p:timing>
 </p:sld>
 </file>
 
@@ -18566,13 +18731,6 @@
       <p:transition spd="slow" advClick="0" advTm="5000"/>
     </mc:Fallback>
   </mc:AlternateContent>
-  <p:timing>
-    <p:tnLst>
-      <p:par>
-        <p:cTn id="1" dur="indefinite" restart="never" nodeType="tmRoot"/>
-      </p:par>
-    </p:tnLst>
-  </p:timing>
 </p:sld>
 </file>
 
@@ -19174,13 +19332,6 @@
       <p:transition spd="slow" advClick="0" advTm="5000"/>
     </mc:Fallback>
   </mc:AlternateContent>
-  <p:timing>
-    <p:tnLst>
-      <p:par>
-        <p:cTn id="1" dur="indefinite" restart="never" nodeType="tmRoot"/>
-      </p:par>
-    </p:tnLst>
-  </p:timing>
 </p:sld>
 </file>
 
@@ -20758,13 +20909,6 @@
       <p:transition spd="slow" advClick="0" advTm="5000"/>
     </mc:Fallback>
   </mc:AlternateContent>
-  <p:timing>
-    <p:tnLst>
-      <p:par>
-        <p:cTn id="1" dur="indefinite" restart="never" nodeType="tmRoot"/>
-      </p:par>
-    </p:tnLst>
-  </p:timing>
 </p:sld>
 </file>
 
@@ -21156,13 +21300,6 @@
       <p:transition spd="slow" advClick="0" advTm="5000"/>
     </mc:Fallback>
   </mc:AlternateContent>
-  <p:timing>
-    <p:tnLst>
-      <p:par>
-        <p:cTn id="1" dur="indefinite" restart="never" nodeType="tmRoot"/>
-      </p:par>
-    </p:tnLst>
-  </p:timing>
 </p:sld>
 </file>
 
@@ -21877,13 +22014,6 @@
       <p:transition spd="slow" advClick="0" advTm="5000"/>
     </mc:Fallback>
   </mc:AlternateContent>
-  <p:timing>
-    <p:tnLst>
-      <p:par>
-        <p:cTn id="1" dur="indefinite" restart="never" nodeType="tmRoot"/>
-      </p:par>
-    </p:tnLst>
-  </p:timing>
 </p:sld>
 </file>
 
@@ -22025,13 +22155,6 @@
       <p:transition spd="slow" advClick="0" advTm="5000"/>
     </mc:Fallback>
   </mc:AlternateContent>
-  <p:timing>
-    <p:tnLst>
-      <p:par>
-        <p:cTn id="1" dur="indefinite" restart="never" nodeType="tmRoot"/>
-      </p:par>
-    </p:tnLst>
-  </p:timing>
 </p:sld>
 </file>
 
@@ -22668,13 +22791,6 @@
       <p:transition spd="slow" advClick="0" advTm="5000"/>
     </mc:Fallback>
   </mc:AlternateContent>
-  <p:timing>
-    <p:tnLst>
-      <p:par>
-        <p:cTn id="1" dur="indefinite" restart="never" nodeType="tmRoot"/>
-      </p:par>
-    </p:tnLst>
-  </p:timing>
 </p:sld>
 </file>
 
@@ -23523,13 +23639,6 @@
       <p:transition spd="slow" advClick="0" advTm="5000"/>
     </mc:Fallback>
   </mc:AlternateContent>
-  <p:timing>
-    <p:tnLst>
-      <p:par>
-        <p:cTn id="1" dur="indefinite" restart="never" nodeType="tmRoot"/>
-      </p:par>
-    </p:tnLst>
-  </p:timing>
 </p:sld>
 </file>
 
@@ -24125,13 +24234,6 @@
       <p:transition spd="slow" advClick="0" advTm="5000"/>
     </mc:Fallback>
   </mc:AlternateContent>
-  <p:timing>
-    <p:tnLst>
-      <p:par>
-        <p:cTn id="1" dur="indefinite" restart="never" nodeType="tmRoot"/>
-      </p:par>
-    </p:tnLst>
-  </p:timing>
 </p:sld>
 </file>
 
@@ -25863,13 +25965,6 @@
       <p:transition spd="slow" advClick="0" advTm="5000"/>
     </mc:Fallback>
   </mc:AlternateContent>
-  <p:timing>
-    <p:tnLst>
-      <p:par>
-        <p:cTn id="1" dur="indefinite" restart="never" nodeType="tmRoot"/>
-      </p:par>
-    </p:tnLst>
-  </p:timing>
 </p:sld>
 </file>
 
@@ -26529,13 +26624,6 @@
       <p:transition spd="slow" advClick="0" advTm="5000"/>
     </mc:Fallback>
   </mc:AlternateContent>
-  <p:timing>
-    <p:tnLst>
-      <p:par>
-        <p:cTn id="1" dur="indefinite" restart="never" nodeType="tmRoot"/>
-      </p:par>
-    </p:tnLst>
-  </p:timing>
 </p:sld>
 </file>
 
@@ -27235,13 +27323,6 @@
       <p:transition spd="slow" advClick="0" advTm="5000"/>
     </mc:Fallback>
   </mc:AlternateContent>
-  <p:timing>
-    <p:tnLst>
-      <p:par>
-        <p:cTn id="1" dur="indefinite" restart="never" nodeType="tmRoot"/>
-      </p:par>
-    </p:tnLst>
-  </p:timing>
 </p:sld>
 </file>
 
@@ -28496,7 +28577,7 @@
                 <a:hlinkClick r:id="rId3">
                   <a:extLst>
                     <a:ext uri="{A12FA001-AC4F-418D-AE19-62706E023703}">
-                      <ahyp:hlinkClr xmlns:ahyp="http://schemas.microsoft.com/office/drawing/2018/hyperlinkcolor" xmlns="" val="tx"/>
+                      <ahyp:hlinkClr xmlns:ahyp="http://schemas.microsoft.com/office/drawing/2018/hyperlinkcolor" val="tx"/>
                     </a:ext>
                   </a:extLst>
                 </a:hlinkClick>
@@ -28569,13 +28650,6 @@
       <p:transition spd="slow" advClick="0" advTm="5000"/>
     </mc:Fallback>
   </mc:AlternateContent>
-  <p:timing>
-    <p:tnLst>
-      <p:par>
-        <p:cTn id="1" dur="indefinite" restart="never" nodeType="tmRoot"/>
-      </p:par>
-    </p:tnLst>
-  </p:timing>
 </p:sld>
 </file>
 
@@ -29458,13 +29532,6 @@
       <p:transition spd="slow" advClick="0" advTm="5000"/>
     </mc:Fallback>
   </mc:AlternateContent>
-  <p:timing>
-    <p:tnLst>
-      <p:par>
-        <p:cTn id="1" dur="indefinite" restart="never" nodeType="tmRoot"/>
-      </p:par>
-    </p:tnLst>
-  </p:timing>
 </p:sld>
 </file>
 
@@ -31411,13 +31478,6 @@
       <p:transition spd="slow" advClick="0" advTm="5000"/>
     </mc:Fallback>
   </mc:AlternateContent>
-  <p:timing>
-    <p:tnLst>
-      <p:par>
-        <p:cTn id="1" dur="indefinite" restart="never" nodeType="tmRoot"/>
-      </p:par>
-    </p:tnLst>
-  </p:timing>
 </p:sld>
 </file>
 

</xml_diff>